<commit_message>
Input for validation functions is from NonDirectional (not manual input), edit validation ppt.
</commit_message>
<xml_diff>
--- a/ARL_ParaPower/Stress_Models/NonDirectional/validation/Stress Validation.pptx
+++ b/ARL_ParaPower/Stress_Models/NonDirectional/validation/Stress Validation.pptx
@@ -202,7 +202,7 @@
           <a:p>
             <a:fld id="{3F653CF4-ACB7-4D2A-9524-1AF9F1142C8C}" type="datetimeFigureOut">
               <a:rPr lang="en-US" smtClean="0"/>
-              <a:t>7/27/2020</a:t>
+              <a:t>7/28/2020</a:t>
             </a:fld>
             <a:endParaRPr lang="en-US"/>
           </a:p>
@@ -733,6 +733,90 @@
           <a:p>
             <a:fld id="{D757EC15-0842-4F18-9350-831057CB381A}" type="slidenum">
               <a:rPr lang="en-US" smtClean="0"/>
+              <a:t>4</a:t>
+            </a:fld>
+            <a:endParaRPr lang="en-US"/>
+          </a:p>
+        </p:txBody>
+      </p:sp>
+    </p:spTree>
+    <p:extLst>
+      <p:ext uri="{BB962C8B-B14F-4D97-AF65-F5344CB8AC3E}">
+        <p14:creationId xmlns:p14="http://schemas.microsoft.com/office/powerpoint/2010/main" val="3669277891"/>
+      </p:ext>
+    </p:extLst>
+  </p:cSld>
+  <p:clrMapOvr>
+    <a:masterClrMapping/>
+  </p:clrMapOvr>
+</p:notes>
+</file>
+
+<file path=ppt/notesSlides/notesSlide4.xml><?xml version="1.0" encoding="utf-8"?>
+<p:notes xmlns:a="http://schemas.openxmlformats.org/drawingml/2006/main" xmlns:r="http://schemas.openxmlformats.org/officeDocument/2006/relationships" xmlns:p="http://schemas.openxmlformats.org/presentationml/2006/main">
+  <p:cSld>
+    <p:spTree>
+      <p:nvGrpSpPr>
+        <p:cNvPr id="1" name=""/>
+        <p:cNvGrpSpPr/>
+        <p:nvPr/>
+      </p:nvGrpSpPr>
+      <p:grpSpPr>
+        <a:xfrm>
+          <a:off x="0" y="0"/>
+          <a:ext cx="0" cy="0"/>
+          <a:chOff x="0" y="0"/>
+          <a:chExt cx="0" cy="0"/>
+        </a:xfrm>
+      </p:grpSpPr>
+      <p:sp>
+        <p:nvSpPr>
+          <p:cNvPr id="2" name="Slide Image Placeholder 1"/>
+          <p:cNvSpPr>
+            <a:spLocks noGrp="1" noRot="1" noChangeAspect="1"/>
+          </p:cNvSpPr>
+          <p:nvPr>
+            <p:ph type="sldImg"/>
+          </p:nvPr>
+        </p:nvSpPr>
+        <p:spPr/>
+      </p:sp>
+      <p:sp>
+        <p:nvSpPr>
+          <p:cNvPr id="3" name="Notes Placeholder 2"/>
+          <p:cNvSpPr>
+            <a:spLocks noGrp="1"/>
+          </p:cNvSpPr>
+          <p:nvPr>
+            <p:ph type="body" idx="1"/>
+          </p:nvPr>
+        </p:nvSpPr>
+        <p:spPr/>
+        <p:txBody>
+          <a:bodyPr/>
+          <a:lstStyle/>
+          <a:p>
+            <a:endParaRPr lang="en-US" dirty="0"/>
+          </a:p>
+        </p:txBody>
+      </p:sp>
+      <p:sp>
+        <p:nvSpPr>
+          <p:cNvPr id="4" name="Slide Number Placeholder 3"/>
+          <p:cNvSpPr>
+            <a:spLocks noGrp="1"/>
+          </p:cNvSpPr>
+          <p:nvPr>
+            <p:ph type="sldNum" sz="quarter" idx="5"/>
+          </p:nvPr>
+        </p:nvSpPr>
+        <p:spPr/>
+        <p:txBody>
+          <a:bodyPr/>
+          <a:lstStyle/>
+          <a:p>
+            <a:fld id="{D757EC15-0842-4F18-9350-831057CB381A}" type="slidenum">
+              <a:rPr lang="en-US" smtClean="0"/>
               <a:t>5</a:t>
             </a:fld>
             <a:endParaRPr lang="en-US"/>
@@ -899,7 +983,7 @@
           <a:p>
             <a:fld id="{875BC192-E964-4F9B-BB22-301FDE7AEE0C}" type="datetimeFigureOut">
               <a:rPr lang="en-US" smtClean="0"/>
-              <a:t>7/27/2020</a:t>
+              <a:t>7/28/2020</a:t>
             </a:fld>
             <a:endParaRPr lang="en-US"/>
           </a:p>
@@ -1097,7 +1181,7 @@
           <a:p>
             <a:fld id="{875BC192-E964-4F9B-BB22-301FDE7AEE0C}" type="datetimeFigureOut">
               <a:rPr lang="en-US" smtClean="0"/>
-              <a:t>7/27/2020</a:t>
+              <a:t>7/28/2020</a:t>
             </a:fld>
             <a:endParaRPr lang="en-US"/>
           </a:p>
@@ -1305,7 +1389,7 @@
           <a:p>
             <a:fld id="{875BC192-E964-4F9B-BB22-301FDE7AEE0C}" type="datetimeFigureOut">
               <a:rPr lang="en-US" smtClean="0"/>
-              <a:t>7/27/2020</a:t>
+              <a:t>7/28/2020</a:t>
             </a:fld>
             <a:endParaRPr lang="en-US"/>
           </a:p>
@@ -1503,7 +1587,7 @@
           <a:p>
             <a:fld id="{875BC192-E964-4F9B-BB22-301FDE7AEE0C}" type="datetimeFigureOut">
               <a:rPr lang="en-US" smtClean="0"/>
-              <a:t>7/27/2020</a:t>
+              <a:t>7/28/2020</a:t>
             </a:fld>
             <a:endParaRPr lang="en-US"/>
           </a:p>
@@ -1778,7 +1862,7 @@
           <a:p>
             <a:fld id="{875BC192-E964-4F9B-BB22-301FDE7AEE0C}" type="datetimeFigureOut">
               <a:rPr lang="en-US" smtClean="0"/>
-              <a:t>7/27/2020</a:t>
+              <a:t>7/28/2020</a:t>
             </a:fld>
             <a:endParaRPr lang="en-US"/>
           </a:p>
@@ -2043,7 +2127,7 @@
           <a:p>
             <a:fld id="{875BC192-E964-4F9B-BB22-301FDE7AEE0C}" type="datetimeFigureOut">
               <a:rPr lang="en-US" smtClean="0"/>
-              <a:t>7/27/2020</a:t>
+              <a:t>7/28/2020</a:t>
             </a:fld>
             <a:endParaRPr lang="en-US"/>
           </a:p>
@@ -2455,7 +2539,7 @@
           <a:p>
             <a:fld id="{875BC192-E964-4F9B-BB22-301FDE7AEE0C}" type="datetimeFigureOut">
               <a:rPr lang="en-US" smtClean="0"/>
-              <a:t>7/27/2020</a:t>
+              <a:t>7/28/2020</a:t>
             </a:fld>
             <a:endParaRPr lang="en-US"/>
           </a:p>
@@ -2596,7 +2680,7 @@
           <a:p>
             <a:fld id="{875BC192-E964-4F9B-BB22-301FDE7AEE0C}" type="datetimeFigureOut">
               <a:rPr lang="en-US" smtClean="0"/>
-              <a:t>7/27/2020</a:t>
+              <a:t>7/28/2020</a:t>
             </a:fld>
             <a:endParaRPr lang="en-US"/>
           </a:p>
@@ -2709,7 +2793,7 @@
           <a:p>
             <a:fld id="{875BC192-E964-4F9B-BB22-301FDE7AEE0C}" type="datetimeFigureOut">
               <a:rPr lang="en-US" smtClean="0"/>
-              <a:t>7/27/2020</a:t>
+              <a:t>7/28/2020</a:t>
             </a:fld>
             <a:endParaRPr lang="en-US"/>
           </a:p>
@@ -3020,7 +3104,7 @@
           <a:p>
             <a:fld id="{875BC192-E964-4F9B-BB22-301FDE7AEE0C}" type="datetimeFigureOut">
               <a:rPr lang="en-US" smtClean="0"/>
-              <a:t>7/27/2020</a:t>
+              <a:t>7/28/2020</a:t>
             </a:fld>
             <a:endParaRPr lang="en-US"/>
           </a:p>
@@ -3308,7 +3392,7 @@
           <a:p>
             <a:fld id="{875BC192-E964-4F9B-BB22-301FDE7AEE0C}" type="datetimeFigureOut">
               <a:rPr lang="en-US" smtClean="0"/>
-              <a:t>7/27/2020</a:t>
+              <a:t>7/28/2020</a:t>
             </a:fld>
             <a:endParaRPr lang="en-US"/>
           </a:p>
@@ -3549,7 +3633,7 @@
           <a:p>
             <a:fld id="{875BC192-E964-4F9B-BB22-301FDE7AEE0C}" type="datetimeFigureOut">
               <a:rPr lang="en-US" smtClean="0"/>
-              <a:t>7/27/2020</a:t>
+              <a:t>7/28/2020</a:t>
             </a:fld>
             <a:endParaRPr lang="en-US"/>
           </a:p>
@@ -4575,7 +4659,7 @@
           </p:nvPr>
         </p:nvPicPr>
         <p:blipFill rotWithShape="1">
-          <a:blip r:embed="rId2">
+          <a:blip r:embed="rId3">
             <a:extLst>
               <a:ext uri="{28A0092B-C50C-407E-A947-70E740481C1C}">
                 <a14:useLocalDpi xmlns:a14="http://schemas.microsoft.com/office/drawing/2010/main" val="0"/>
@@ -4610,7 +4694,7 @@
         </p:nvSpPr>
         <p:spPr>
           <a:xfrm>
-            <a:off x="4178530" y="3606552"/>
+            <a:off x="4248458" y="3585120"/>
             <a:ext cx="2211450" cy="469106"/>
           </a:xfrm>
         </p:spPr>
@@ -4645,7 +4729,7 @@
         </p:nvSpPr>
         <p:spPr>
           <a:xfrm>
-            <a:off x="7579260" y="3580428"/>
+            <a:off x="7627898" y="3585120"/>
             <a:ext cx="3001251" cy="469106"/>
           </a:xfrm>
           <a:prstGeom prst="rect">
@@ -4868,7 +4952,15 @@
                 </a:pPr>
                 <a:r>
                   <a:rPr lang="en-US" dirty="0"/>
-                  <a:t>“Lower Left” device in iPack19 (Fig. 11c)</a:t>
+                  <a:t>“Lower Left” device in iPack19 (Fig. 11c): </a:t>
+                </a:r>
+                <a:r>
+                  <a:rPr lang="en-US" dirty="0" err="1"/>
+                  <a:t>ParaPower</a:t>
+                </a:r>
+                <a:r>
+                  <a:rPr lang="en-US" dirty="0"/>
+                  <a:t> numerical values superimposed on FEA results</a:t>
                 </a:r>
               </a:p>
               <a:p>
@@ -4935,7 +5027,7 @@
                             <m:nor/>
                           </m:rPr>
                           <a:rPr lang="en-US" sz="1600" dirty="0"/>
-                          <m:t>19-</m:t>
+                          <m:t>19−</m:t>
                         </m:r>
                         <m:r>
                           <m:rPr>
@@ -5020,7 +5112,7 @@
                 <a:avLst/>
               </a:prstGeom>
               <a:blipFill>
-                <a:blip r:embed="rId3"/>
+                <a:blip r:embed="rId4"/>
                 <a:stretch>
                   <a:fillRect l="-371" b="-4180"/>
                 </a:stretch>
@@ -5043,7 +5135,7 @@
       </mc:AlternateContent>
       <p:pic>
         <p:nvPicPr>
-          <p:cNvPr id="10" name="Picture 9" descr="A screenshot of a cell phone&#10;&#10;Description automatically generated">
+          <p:cNvPr id="10" name="Picture 9">
             <a:extLst>
               <a:ext uri="{FF2B5EF4-FFF2-40B4-BE49-F238E27FC236}">
                 <a16:creationId xmlns:a16="http://schemas.microsoft.com/office/drawing/2014/main" id="{CF233045-AF36-4D9C-A71F-E48AAC9AB1F0}"/>
@@ -5056,20 +5148,20 @@
           <p:nvPr/>
         </p:nvPicPr>
         <p:blipFill rotWithShape="1">
-          <a:blip r:embed="rId4">
+          <a:blip r:embed="rId5">
             <a:extLst>
               <a:ext uri="{28A0092B-C50C-407E-A947-70E740481C1C}">
                 <a14:useLocalDpi xmlns:a14="http://schemas.microsoft.com/office/drawing/2010/main" val="0"/>
               </a:ext>
             </a:extLst>
           </a:blip>
-          <a:srcRect t="7421"/>
+          <a:srcRect t="7366"/>
           <a:stretch/>
         </p:blipFill>
         <p:spPr>
           <a:xfrm>
-            <a:off x="3834639" y="4134305"/>
-            <a:ext cx="3436281" cy="2385944"/>
+            <a:off x="3791232" y="4150456"/>
+            <a:ext cx="3434237" cy="2385944"/>
           </a:xfrm>
           <a:prstGeom prst="rect">
             <a:avLst/>
@@ -5078,7 +5170,7 @@
       </p:pic>
       <p:pic>
         <p:nvPicPr>
-          <p:cNvPr id="14" name="Picture 13" descr="A screenshot of a cell phone&#10;&#10;Description automatically generated">
+          <p:cNvPr id="14" name="Picture 13">
             <a:extLst>
               <a:ext uri="{FF2B5EF4-FFF2-40B4-BE49-F238E27FC236}">
                 <a16:creationId xmlns:a16="http://schemas.microsoft.com/office/drawing/2014/main" id="{70B3D057-F59C-4874-A426-F6F95BDA79E3}"/>
@@ -5090,21 +5182,21 @@
           </p:cNvPicPr>
           <p:nvPr/>
         </p:nvPicPr>
-        <p:blipFill rotWithShape="1">
-          <a:blip r:embed="rId5">
+        <p:blipFill>
+          <a:blip r:embed="rId6">
             <a:extLst>
               <a:ext uri="{28A0092B-C50C-407E-A947-70E740481C1C}">
                 <a14:useLocalDpi xmlns:a14="http://schemas.microsoft.com/office/drawing/2010/main" val="0"/>
               </a:ext>
             </a:extLst>
           </a:blip>
-          <a:srcRect t="6805"/>
+          <a:srcRect/>
           <a:stretch/>
         </p:blipFill>
         <p:spPr>
           <a:xfrm>
-            <a:off x="7579260" y="4134305"/>
-            <a:ext cx="3413521" cy="2385944"/>
+            <a:off x="7752429" y="4012570"/>
+            <a:ext cx="3363245" cy="2522434"/>
           </a:xfrm>
           <a:prstGeom prst="rect">
             <a:avLst/>
@@ -5163,13 +5255,13 @@
               </a:ext>
             </a:extLst>
           </a:blip>
-          <a:srcRect t="6400"/>
+          <a:srcRect l="2234" t="6895" r="3017" b="-3077"/>
           <a:stretch/>
         </p:blipFill>
         <p:spPr>
           <a:xfrm>
-            <a:off x="3668517" y="3853305"/>
-            <a:ext cx="3569222" cy="2505605"/>
+            <a:off x="3668517" y="3927850"/>
+            <a:ext cx="3519150" cy="2679297"/>
           </a:xfrm>
           <a:prstGeom prst="rect">
             <a:avLst/>
@@ -5265,7 +5357,7 @@
         </p:nvSpPr>
         <p:spPr>
           <a:xfrm>
-            <a:off x="4064382" y="3342470"/>
+            <a:off x="4188207" y="3335364"/>
             <a:ext cx="2211450" cy="469106"/>
           </a:xfrm>
         </p:spPr>
@@ -5300,7 +5392,7 @@
         </p:nvSpPr>
         <p:spPr>
           <a:xfrm>
-            <a:off x="7786425" y="3249149"/>
+            <a:off x="7757850" y="3335364"/>
             <a:ext cx="3001251" cy="469106"/>
           </a:xfrm>
           <a:prstGeom prst="rect">
@@ -5501,7 +5593,7 @@
             <p:spPr>
               <a:xfrm>
                 <a:off x="925620" y="1135321"/>
-                <a:ext cx="7026785" cy="1896609"/>
+                <a:ext cx="10542674" cy="2312108"/>
               </a:xfrm>
               <a:prstGeom prst="rect">
                 <a:avLst/>
@@ -5523,8 +5615,26 @@
                 </a:pPr>
                 <a:r>
                   <a:rPr lang="en-US" dirty="0"/>
-                  <a:t>“Lower Left” device in iPack17 (Fig. 10)</a:t>
+                  <a:t>“Lower Left” device in iPack17 (Fig. 10): </a:t>
                 </a:r>
+                <a:r>
+                  <a:rPr lang="en-US" dirty="0" err="1"/>
+                  <a:t>ParaPower</a:t>
+                </a:r>
+                <a:r>
+                  <a:rPr lang="en-US" dirty="0"/>
+                  <a:t> numerical values superimposed on FEA results</a:t>
+                </a:r>
+              </a:p>
+              <a:p>
+                <a:pPr marL="285750" indent="-285750">
+                  <a:lnSpc>
+                    <a:spcPct val="150000"/>
+                  </a:lnSpc>
+                  <a:buFont typeface="Arial" panose="020B0604020202020204" pitchFamily="34" charset="0"/>
+                  <a:buChar char="•"/>
+                </a:pPr>
+                <a:endParaRPr lang="en-US" dirty="0"/>
               </a:p>
               <a:p>
                 <a:pPr marL="285750" indent="-285750">
@@ -5576,14 +5686,7 @@
                             <m:nor/>
                           </m:rPr>
                           <a:rPr lang="en-US" sz="1600" dirty="0"/>
-                          <m:t>iP</m:t>
-                        </m:r>
-                        <m:r>
-                          <m:rPr>
-                            <m:nor/>
-                          </m:rPr>
-                          <a:rPr lang="en-US" sz="1600" dirty="0"/>
-                          <m:t>ACK</m:t>
+                          <m:t>iPACK</m:t>
                         </m:r>
                         <m:r>
                           <m:rPr>
@@ -5613,14 +5716,7 @@
                             <m:nor/>
                           </m:rPr>
                           <a:rPr lang="en-US" sz="1600" dirty="0"/>
-                          <m:t>iP</m:t>
-                        </m:r>
-                        <m:r>
-                          <m:rPr>
-                            <m:nor/>
-                          </m:rPr>
-                          <a:rPr lang="en-US" sz="1600" dirty="0"/>
-                          <m:t>ACK</m:t>
+                          <m:t>iPACK</m:t>
                         </m:r>
                         <m:r>
                           <m:rPr>
@@ -5669,7 +5765,7 @@
             <p:spPr>
               <a:xfrm>
                 <a:off x="925620" y="1135321"/>
-                <a:ext cx="7026785" cy="1896609"/>
+                <a:ext cx="10542674" cy="2312108"/>
               </a:xfrm>
               <a:prstGeom prst="rect">
                 <a:avLst/>
@@ -5677,7 +5773,7 @@
               <a:blipFill>
                 <a:blip r:embed="rId4"/>
                 <a:stretch>
-                  <a:fillRect l="-607" b="-4180"/>
+                  <a:fillRect l="-405" b="-3158"/>
                 </a:stretch>
               </a:blipFill>
             </p:spPr>
@@ -5718,13 +5814,13 @@
               </a:ext>
             </a:extLst>
           </a:blip>
-          <a:srcRect t="7177"/>
+          <a:srcRect t="4226"/>
           <a:stretch/>
         </p:blipFill>
         <p:spPr>
           <a:xfrm>
-            <a:off x="7656164" y="3773725"/>
-            <a:ext cx="3699224" cy="2575308"/>
+            <a:off x="7575082" y="3826071"/>
+            <a:ext cx="3893212" cy="2796528"/>
           </a:xfrm>
           <a:prstGeom prst="rect">
             <a:avLst/>

</xml_diff>

<commit_message>
Changes to validation/comparison code, modified ipack model
</commit_message>
<xml_diff>
--- a/ARL_ParaPower/Stress_Models/NonDirectional/validation/Stress Validation.pptx
+++ b/ARL_ParaPower/Stress_Models/NonDirectional/validation/Stress Validation.pptx
@@ -4296,7 +4296,7 @@
       </p:sp>
       <p:pic>
         <p:nvPicPr>
-          <p:cNvPr id="4" name="Picture 3" descr="A screenshot of a computer&#10;&#10;Description automatically generated">
+          <p:cNvPr id="4" name="Picture 3">
             <a:extLst>
               <a:ext uri="{FF2B5EF4-FFF2-40B4-BE49-F238E27FC236}">
                 <a16:creationId xmlns:a16="http://schemas.microsoft.com/office/drawing/2014/main" id="{DAF63DA3-2545-4EAF-8E37-D6011A13F65F}"/>
@@ -4316,13 +4316,13 @@
               </a:ext>
             </a:extLst>
           </a:blip>
-          <a:srcRect l="4333" t="57348" r="53633" b="2248"/>
+          <a:srcRect t="57494" r="54152"/>
           <a:stretch/>
         </p:blipFill>
         <p:spPr>
           <a:xfrm>
-            <a:off x="6096000" y="4139711"/>
-            <a:ext cx="3236119" cy="1982787"/>
+            <a:off x="6455541" y="4041829"/>
+            <a:ext cx="3144548" cy="2135134"/>
           </a:xfrm>
           <a:prstGeom prst="rect">
             <a:avLst/>
@@ -4468,7 +4468,7 @@
       </p:grpSpPr>
       <p:pic>
         <p:nvPicPr>
-          <p:cNvPr id="9" name="Picture 8" descr="A screenshot of a computer&#10;&#10;Description automatically generated">
+          <p:cNvPr id="9" name="Picture 8">
             <a:extLst>
               <a:ext uri="{FF2B5EF4-FFF2-40B4-BE49-F238E27FC236}">
                 <a16:creationId xmlns:a16="http://schemas.microsoft.com/office/drawing/2014/main" id="{53456CF4-5BFB-424B-8AB7-3C0EF007E252}"/>
@@ -4488,14 +4488,13 @@
               </a:ext>
             </a:extLst>
           </a:blip>
-          <a:stretch>
-            <a:fillRect/>
-          </a:stretch>
+          <a:srcRect/>
+          <a:stretch/>
         </p:blipFill>
         <p:spPr>
           <a:xfrm>
-            <a:off x="871531" y="28576"/>
-            <a:ext cx="10615830" cy="6766817"/>
+            <a:off x="1604831" y="45591"/>
+            <a:ext cx="9333541" cy="6766817"/>
           </a:xfrm>
           <a:prstGeom prst="rect">
             <a:avLst/>
@@ -4913,8 +4912,8 @@
           </a:p>
         </p:txBody>
       </p:sp>
-      <mc:AlternateContent xmlns:mc="http://schemas.openxmlformats.org/markup-compatibility/2006">
-        <mc:Choice xmlns:a14="http://schemas.microsoft.com/office/drawing/2010/main" Requires="a14">
+      <mc:AlternateContent xmlns:mc="http://schemas.openxmlformats.org/markup-compatibility/2006" xmlns:a14="http://schemas.microsoft.com/office/drawing/2010/main">
+        <mc:Choice Requires="a14">
           <p:sp>
             <p:nvSpPr>
               <p:cNvPr id="19" name="TextBox 18">
@@ -5088,7 +5087,7 @@
             </p:txBody>
           </p:sp>
         </mc:Choice>
-        <mc:Fallback>
+        <mc:Fallback xmlns="">
           <p:sp>
             <p:nvSpPr>
               <p:cNvPr id="19" name="TextBox 18">
@@ -5576,8 +5575,8 @@
           </a:p>
         </p:txBody>
       </p:sp>
-      <mc:AlternateContent xmlns:mc="http://schemas.openxmlformats.org/markup-compatibility/2006">
-        <mc:Choice xmlns:a14="http://schemas.microsoft.com/office/drawing/2010/main" Requires="a14">
+      <mc:AlternateContent xmlns:mc="http://schemas.openxmlformats.org/markup-compatibility/2006" xmlns:a14="http://schemas.microsoft.com/office/drawing/2010/main">
+        <mc:Choice Requires="a14">
           <p:sp>
             <p:nvSpPr>
               <p:cNvPr id="19" name="TextBox 18">
@@ -5747,7 +5746,7 @@
             </p:txBody>
           </p:sp>
         </mc:Choice>
-        <mc:Fallback>
+        <mc:Fallback xmlns="">
           <p:sp>
             <p:nvSpPr>
               <p:cNvPr id="19" name="TextBox 18">

</xml_diff>

<commit_message>
iPACK skeleton case, variable name changes and restructuring of testcasesStress
</commit_message>
<xml_diff>
--- a/ARL_ParaPower/Stress_Models/NonDirectional/validation/Stress Validation.pptx
+++ b/ARL_ParaPower/Stress_Models/NonDirectional/validation/Stress Validation.pptx
@@ -202,7 +202,7 @@
           <a:p>
             <a:fld id="{3F653CF4-ACB7-4D2A-9524-1AF9F1142C8C}" type="datetimeFigureOut">
               <a:rPr lang="en-US" smtClean="0"/>
-              <a:t>7/28/2020</a:t>
+              <a:t>7/31/2020</a:t>
             </a:fld>
             <a:endParaRPr lang="en-US"/>
           </a:p>
@@ -983,7 +983,7 @@
           <a:p>
             <a:fld id="{875BC192-E964-4F9B-BB22-301FDE7AEE0C}" type="datetimeFigureOut">
               <a:rPr lang="en-US" smtClean="0"/>
-              <a:t>7/28/2020</a:t>
+              <a:t>7/31/2020</a:t>
             </a:fld>
             <a:endParaRPr lang="en-US"/>
           </a:p>
@@ -1181,7 +1181,7 @@
           <a:p>
             <a:fld id="{875BC192-E964-4F9B-BB22-301FDE7AEE0C}" type="datetimeFigureOut">
               <a:rPr lang="en-US" smtClean="0"/>
-              <a:t>7/28/2020</a:t>
+              <a:t>7/31/2020</a:t>
             </a:fld>
             <a:endParaRPr lang="en-US"/>
           </a:p>
@@ -1389,7 +1389,7 @@
           <a:p>
             <a:fld id="{875BC192-E964-4F9B-BB22-301FDE7AEE0C}" type="datetimeFigureOut">
               <a:rPr lang="en-US" smtClean="0"/>
-              <a:t>7/28/2020</a:t>
+              <a:t>7/31/2020</a:t>
             </a:fld>
             <a:endParaRPr lang="en-US"/>
           </a:p>
@@ -1587,7 +1587,7 @@
           <a:p>
             <a:fld id="{875BC192-E964-4F9B-BB22-301FDE7AEE0C}" type="datetimeFigureOut">
               <a:rPr lang="en-US" smtClean="0"/>
-              <a:t>7/28/2020</a:t>
+              <a:t>7/31/2020</a:t>
             </a:fld>
             <a:endParaRPr lang="en-US"/>
           </a:p>
@@ -1862,7 +1862,7 @@
           <a:p>
             <a:fld id="{875BC192-E964-4F9B-BB22-301FDE7AEE0C}" type="datetimeFigureOut">
               <a:rPr lang="en-US" smtClean="0"/>
-              <a:t>7/28/2020</a:t>
+              <a:t>7/31/2020</a:t>
             </a:fld>
             <a:endParaRPr lang="en-US"/>
           </a:p>
@@ -2127,7 +2127,7 @@
           <a:p>
             <a:fld id="{875BC192-E964-4F9B-BB22-301FDE7AEE0C}" type="datetimeFigureOut">
               <a:rPr lang="en-US" smtClean="0"/>
-              <a:t>7/28/2020</a:t>
+              <a:t>7/31/2020</a:t>
             </a:fld>
             <a:endParaRPr lang="en-US"/>
           </a:p>
@@ -2539,7 +2539,7 @@
           <a:p>
             <a:fld id="{875BC192-E964-4F9B-BB22-301FDE7AEE0C}" type="datetimeFigureOut">
               <a:rPr lang="en-US" smtClean="0"/>
-              <a:t>7/28/2020</a:t>
+              <a:t>7/31/2020</a:t>
             </a:fld>
             <a:endParaRPr lang="en-US"/>
           </a:p>
@@ -2680,7 +2680,7 @@
           <a:p>
             <a:fld id="{875BC192-E964-4F9B-BB22-301FDE7AEE0C}" type="datetimeFigureOut">
               <a:rPr lang="en-US" smtClean="0"/>
-              <a:t>7/28/2020</a:t>
+              <a:t>7/31/2020</a:t>
             </a:fld>
             <a:endParaRPr lang="en-US"/>
           </a:p>
@@ -2793,7 +2793,7 @@
           <a:p>
             <a:fld id="{875BC192-E964-4F9B-BB22-301FDE7AEE0C}" type="datetimeFigureOut">
               <a:rPr lang="en-US" smtClean="0"/>
-              <a:t>7/28/2020</a:t>
+              <a:t>7/31/2020</a:t>
             </a:fld>
             <a:endParaRPr lang="en-US"/>
           </a:p>
@@ -3104,7 +3104,7 @@
           <a:p>
             <a:fld id="{875BC192-E964-4F9B-BB22-301FDE7AEE0C}" type="datetimeFigureOut">
               <a:rPr lang="en-US" smtClean="0"/>
-              <a:t>7/28/2020</a:t>
+              <a:t>7/31/2020</a:t>
             </a:fld>
             <a:endParaRPr lang="en-US"/>
           </a:p>
@@ -3392,7 +3392,7 @@
           <a:p>
             <a:fld id="{875BC192-E964-4F9B-BB22-301FDE7AEE0C}" type="datetimeFigureOut">
               <a:rPr lang="en-US" smtClean="0"/>
-              <a:t>7/28/2020</a:t>
+              <a:t>7/31/2020</a:t>
             </a:fld>
             <a:endParaRPr lang="en-US"/>
           </a:p>
@@ -3633,7 +3633,7 @@
           <a:p>
             <a:fld id="{875BC192-E964-4F9B-BB22-301FDE7AEE0C}" type="datetimeFigureOut">
               <a:rPr lang="en-US" smtClean="0"/>
-              <a:t>7/28/2020</a:t>
+              <a:t>7/31/2020</a:t>
             </a:fld>
             <a:endParaRPr lang="en-US"/>
           </a:p>
@@ -5575,8 +5575,8 @@
           </a:p>
         </p:txBody>
       </p:sp>
-      <mc:AlternateContent xmlns:mc="http://schemas.openxmlformats.org/markup-compatibility/2006" xmlns:a14="http://schemas.microsoft.com/office/drawing/2010/main">
-        <mc:Choice Requires="a14">
+      <mc:AlternateContent xmlns:mc="http://schemas.openxmlformats.org/markup-compatibility/2006">
+        <mc:Choice xmlns:a14="http://schemas.microsoft.com/office/drawing/2010/main" Requires="a14">
           <p:sp>
             <p:nvSpPr>
               <p:cNvPr id="19" name="TextBox 18">
@@ -5592,7 +5592,7 @@
             <p:spPr>
               <a:xfrm>
                 <a:off x="925620" y="1135321"/>
-                <a:ext cx="10542674" cy="2312108"/>
+                <a:ext cx="10542674" cy="1896609"/>
               </a:xfrm>
               <a:prstGeom prst="rect">
                 <a:avLst/>
@@ -5624,16 +5624,6 @@
                   <a:rPr lang="en-US" dirty="0"/>
                   <a:t> numerical values superimposed on FEA results</a:t>
                 </a:r>
-              </a:p>
-              <a:p>
-                <a:pPr marL="285750" indent="-285750">
-                  <a:lnSpc>
-                    <a:spcPct val="150000"/>
-                  </a:lnSpc>
-                  <a:buFont typeface="Arial" panose="020B0604020202020204" pitchFamily="34" charset="0"/>
-                  <a:buChar char="•"/>
-                </a:pPr>
-                <a:endParaRPr lang="en-US" dirty="0"/>
               </a:p>
               <a:p>
                 <a:pPr marL="285750" indent="-285750">
@@ -5746,7 +5736,7 @@
             </p:txBody>
           </p:sp>
         </mc:Choice>
-        <mc:Fallback xmlns="">
+        <mc:Fallback>
           <p:sp>
             <p:nvSpPr>
               <p:cNvPr id="19" name="TextBox 18">
@@ -5764,7 +5754,7 @@
             <p:spPr>
               <a:xfrm>
                 <a:off x="925620" y="1135321"/>
-                <a:ext cx="10542674" cy="2312108"/>
+                <a:ext cx="10542674" cy="1896609"/>
               </a:xfrm>
               <a:prstGeom prst="rect">
                 <a:avLst/>
@@ -5772,7 +5762,7 @@
               <a:blipFill>
                 <a:blip r:embed="rId4"/>
                 <a:stretch>
-                  <a:fillRect l="-405" b="-3158"/>
+                  <a:fillRect l="-405" b="-4180"/>
                 </a:stretch>
               </a:blipFill>
             </p:spPr>

</xml_diff>